<commit_message>
Update blog post 2
</commit_message>
<xml_diff>
--- a/images/diagram-creation.pptx
+++ b/images/diagram-creation.pptx
@@ -104,6 +104,11 @@
       </a:defRPr>
     </a:lvl9pPr>
   </p:defaultTextStyle>
+  <p:extLst>
+    <p:ext uri="{EFAFB233-063F-42B5-8137-9DF3F51BA10A}">
+      <p15:sldGuideLst xmlns:p15="http://schemas.microsoft.com/office/powerpoint/2012/main"/>
+    </p:ext>
+  </p:extLst>
 </p:presentation>
 </file>
 
@@ -3421,7 +3426,7 @@
               <a:avLst/>
             </a:prstGeom>
             <a:solidFill>
-              <a:schemeClr val="tx1"/>
+              <a:srgbClr val="353535"/>
             </a:solidFill>
             <a:ln>
               <a:noFill/>
@@ -3488,6 +3493,36 @@
           </p:spPr>
         </p:pic>
       </p:grpSp>
+      <p:pic>
+        <p:nvPicPr>
+          <p:cNvPr id="3" name="Picture 2">
+            <a:extLst>
+              <a:ext uri="{FF2B5EF4-FFF2-40B4-BE49-F238E27FC236}">
+                <a16:creationId xmlns:a16="http://schemas.microsoft.com/office/drawing/2014/main" id="{6BC4C3C1-1D3A-7A35-9B5A-7E35B083717F}"/>
+              </a:ext>
+            </a:extLst>
+          </p:cNvPr>
+          <p:cNvPicPr>
+            <a:picLocks noChangeAspect="1"/>
+          </p:cNvPicPr>
+          <p:nvPr/>
+        </p:nvPicPr>
+        <p:blipFill>
+          <a:blip r:embed="rId6"/>
+          <a:stretch>
+            <a:fillRect/>
+          </a:stretch>
+        </p:blipFill>
+        <p:spPr>
+          <a:xfrm>
+            <a:off x="5859353" y="1843741"/>
+            <a:ext cx="2745651" cy="1619454"/>
+          </a:xfrm>
+          <a:prstGeom prst="rect">
+            <a:avLst/>
+          </a:prstGeom>
+        </p:spPr>
+      </p:pic>
     </p:spTree>
     <p:extLst>
       <p:ext uri="{BB962C8B-B14F-4D97-AF65-F5344CB8AC3E}">

</xml_diff>